<commit_message>
Fixed typo and clarified lifetime parameter
</commit_message>
<xml_diff>
--- a/IETF97_slides_protocol-negotiation.pptx
+++ b/IETF97_slides_protocol-negotiation.pptx
@@ -4463,14 +4463,7 @@
                 <a:latin typeface="Century Gothic"/>
                 <a:cs typeface="Century Gothic"/>
               </a:rPr>
-              <a:t>Summary of changes from -</a:t>
-            </a:r>
-            <a:r>
-              <a:rPr lang="en-GB" dirty="0" smtClean="0">
-                <a:latin typeface="Century Gothic"/>
-                <a:cs typeface="Century Gothic"/>
-              </a:rPr>
-              <a:t>03</a:t>
+              <a:t>Summary of changes from -03</a:t>
             </a:r>
             <a:endParaRPr lang="en-GB" dirty="0">
               <a:solidFill>
@@ -4854,15 +4847,7 @@
           <a:p>
             <a:r>
               <a:rPr lang="en-US" dirty="0" smtClean="0"/>
-              <a:t>IETF </a:t>
-            </a:r>
-            <a:r>
-              <a:rPr lang="en-US" dirty="0" smtClean="0"/>
-              <a:t>97 </a:t>
-            </a:r>
-            <a:r>
-              <a:rPr lang="en-US" dirty="0" smtClean="0"/>
-              <a:t>draft-</a:t>
+              <a:t>IETF 97 draft-</a:t>
             </a:r>
             <a:r>
               <a:rPr lang="en-US" dirty="0" err="1" smtClean="0"/>
@@ -4939,21 +4924,7 @@
                 <a:latin typeface="Century Gothic"/>
                 <a:cs typeface="Century Gothic"/>
               </a:rPr>
-              <a:t>Remove link attribute </a:t>
-            </a:r>
-            <a:r>
-              <a:rPr lang="en-GB" sz="3556" dirty="0" smtClean="0">
-                <a:latin typeface="Century Gothic"/>
-                <a:cs typeface="Century Gothic"/>
-              </a:rPr>
-              <a:t>&amp; </a:t>
-            </a:r>
-            <a:r>
-              <a:rPr lang="en-GB" sz="3556" dirty="0" smtClean="0">
-                <a:latin typeface="Century Gothic"/>
-                <a:cs typeface="Century Gothic"/>
-              </a:rPr>
-              <a:t>relation type</a:t>
+              <a:t>Remove link attribute &amp; relation type</a:t>
             </a:r>
             <a:endParaRPr lang="en-GB" dirty="0">
               <a:solidFill>
@@ -5122,14 +5093,7 @@
                 <a:latin typeface="Courier"/>
                 <a:cs typeface="Courier"/>
               </a:rPr>
-              <a:t>REQ</a:t>
-            </a:r>
-            <a:r>
-              <a:rPr lang="en-US" sz="2162" dirty="0" smtClean="0">
-                <a:latin typeface="Courier"/>
-                <a:cs typeface="Courier"/>
-              </a:rPr>
-              <a:t>: GET /.well-known/core</a:t>
+              <a:t>REQ: GET /.well-known/core</a:t>
             </a:r>
           </a:p>
           <a:p>
@@ -5150,37 +5114,19 @@
                 <a:latin typeface="Courier"/>
                 <a:cs typeface="Courier"/>
               </a:rPr>
-              <a:t>RES</a:t>
-            </a:r>
+              <a:t>RES: 2.05 Content</a:t>
+            </a:r>
+          </a:p>
+          <a:p>
+            <a:pPr lvl="1">
+              <a:buNone/>
+            </a:pPr>
             <a:r>
               <a:rPr lang="en-US" sz="2162" dirty="0" smtClean="0">
                 <a:latin typeface="Courier"/>
                 <a:cs typeface="Courier"/>
               </a:rPr>
-              <a:t>: 2.05 Content</a:t>
-            </a:r>
-            <a:endParaRPr lang="en-US" sz="2162" dirty="0" smtClean="0">
-              <a:latin typeface="Courier"/>
-              <a:cs typeface="Courier"/>
-            </a:endParaRPr>
-          </a:p>
-          <a:p>
-            <a:pPr lvl="1">
-              <a:buNone/>
-            </a:pPr>
-            <a:r>
-              <a:rPr lang="en-US" sz="2162" dirty="0" smtClean="0">
-                <a:latin typeface="Courier"/>
-                <a:cs typeface="Courier"/>
-              </a:rPr>
-              <a:t>&lt;</a:t>
-            </a:r>
-            <a:r>
-              <a:rPr lang="en-US" sz="2162" dirty="0" smtClean="0">
-                <a:latin typeface="Courier"/>
-                <a:cs typeface="Courier"/>
-              </a:rPr>
-              <a:t>/sensors&gt;;ct=40;title="Sensor Index", </a:t>
+              <a:t>&lt;/sensors&gt;;ct=40;title="Sensor Index", </a:t>
             </a:r>
             <a:r>
               <a:rPr lang="en-US" sz="2162" dirty="0" err="1" smtClean="0">
@@ -5269,10 +5215,6 @@
               </a:rPr>
               <a:t>,</a:t>
             </a:r>
-            <a:endParaRPr lang="en-US" sz="2162" dirty="0" smtClean="0">
-              <a:latin typeface="Courier"/>
-              <a:cs typeface="Courier"/>
-            </a:endParaRPr>
           </a:p>
           <a:p>
             <a:pPr lvl="1">
@@ -5283,98 +5225,76 @@
                 <a:latin typeface="Courier"/>
                 <a:cs typeface="Courier"/>
               </a:rPr>
-              <a:t>&lt;</a:t>
+              <a:t>&lt;/sensors/temp&gt;;</a:t>
+            </a:r>
+            <a:r>
+              <a:rPr lang="en-US" sz="2162" dirty="0" err="1" smtClean="0">
+                <a:latin typeface="Courier"/>
+                <a:cs typeface="Courier"/>
+              </a:rPr>
+              <a:t>rt</a:t>
             </a:r>
             <a:r>
               <a:rPr lang="en-US" sz="2162" dirty="0" smtClean="0">
                 <a:latin typeface="Courier"/>
                 <a:cs typeface="Courier"/>
               </a:rPr>
-              <a:t>/sensors/temp&gt;;</a:t>
+              <a:t>="temperature-</a:t>
             </a:r>
             <a:r>
               <a:rPr lang="en-US" sz="2162" dirty="0" err="1" smtClean="0">
                 <a:latin typeface="Courier"/>
                 <a:cs typeface="Courier"/>
               </a:rPr>
-              <a:t>rt</a:t>
+              <a:t>c";if</a:t>
             </a:r>
             <a:r>
               <a:rPr lang="en-US" sz="2162" dirty="0" smtClean="0">
                 <a:latin typeface="Courier"/>
                 <a:cs typeface="Courier"/>
               </a:rPr>
-              <a:t>="temperature-</a:t>
+              <a:t>="sensor",</a:t>
+            </a:r>
+          </a:p>
+          <a:p>
+            <a:pPr lvl="1">
+              <a:buNone/>
+            </a:pPr>
+            <a:r>
+              <a:rPr lang="en-US" sz="2162" dirty="0" smtClean="0">
+                <a:latin typeface="Courier"/>
+                <a:cs typeface="Courier"/>
+              </a:rPr>
+              <a:t>&lt;/sensors/light&gt;;</a:t>
             </a:r>
             <a:r>
               <a:rPr lang="en-US" sz="2162" dirty="0" err="1" smtClean="0">
                 <a:latin typeface="Courier"/>
                 <a:cs typeface="Courier"/>
               </a:rPr>
-              <a:t>c";if</a:t>
+              <a:t>rt</a:t>
             </a:r>
             <a:r>
               <a:rPr lang="en-US" sz="2162" dirty="0" smtClean="0">
                 <a:latin typeface="Courier"/>
                 <a:cs typeface="Courier"/>
               </a:rPr>
-              <a:t>="sensor",</a:t>
-            </a:r>
-            <a:endParaRPr lang="en-US" sz="2162" dirty="0" smtClean="0">
-              <a:latin typeface="Courier"/>
-              <a:cs typeface="Courier"/>
-            </a:endParaRPr>
-          </a:p>
-          <a:p>
-            <a:pPr lvl="1">
-              <a:buNone/>
-            </a:pPr>
+              <a:t>="light-</a:t>
+            </a:r>
+            <a:r>
+              <a:rPr lang="en-US" sz="2162" dirty="0" err="1" smtClean="0">
+                <a:latin typeface="Courier"/>
+                <a:cs typeface="Courier"/>
+              </a:rPr>
+              <a:t>lux";if</a:t>
+            </a:r>
             <a:r>
               <a:rPr lang="en-US" sz="2162" dirty="0" smtClean="0">
                 <a:latin typeface="Courier"/>
                 <a:cs typeface="Courier"/>
               </a:rPr>
-              <a:t>&lt;</a:t>
-            </a:r>
-            <a:r>
-              <a:rPr lang="en-US" sz="2162" dirty="0" smtClean="0">
-                <a:latin typeface="Courier"/>
-                <a:cs typeface="Courier"/>
-              </a:rPr>
-              <a:t>/sensors/light&gt;;</a:t>
-            </a:r>
-            <a:r>
-              <a:rPr lang="en-US" sz="2162" dirty="0" err="1" smtClean="0">
-                <a:latin typeface="Courier"/>
-                <a:cs typeface="Courier"/>
-              </a:rPr>
-              <a:t>rt</a:t>
-            </a:r>
-            <a:r>
-              <a:rPr lang="en-US" sz="2162" dirty="0" smtClean="0">
-                <a:latin typeface="Courier"/>
-                <a:cs typeface="Courier"/>
-              </a:rPr>
-              <a:t>="light-</a:t>
-            </a:r>
-            <a:r>
-              <a:rPr lang="en-US" sz="2162" dirty="0" err="1" smtClean="0">
-                <a:latin typeface="Courier"/>
-                <a:cs typeface="Courier"/>
-              </a:rPr>
-              <a:t>lux";if</a:t>
-            </a:r>
-            <a:r>
-              <a:rPr lang="en-US" sz="2162" dirty="0" smtClean="0">
-                <a:latin typeface="Courier"/>
-                <a:cs typeface="Courier"/>
-              </a:rPr>
               <a:t>="sensor",</a:t>
             </a:r>
-            <a:endParaRPr lang="en-US" sz="2162" dirty="0" smtClean="0">
-              <a:latin typeface="Courier"/>
-              <a:cs typeface="Courier"/>
-            </a:endParaRPr>
           </a:p>
           <a:p>
             <a:pPr lvl="1">
@@ -5450,13 +5370,6 @@
               </a:rPr>
               <a:t>",</a:t>
             </a:r>
-            <a:endParaRPr lang="en-US" sz="2162" dirty="0" smtClean="0">
-              <a:solidFill>
-                <a:srgbClr val="FF0000"/>
-              </a:solidFill>
-              <a:latin typeface="Courier"/>
-              <a:cs typeface="Courier"/>
-            </a:endParaRPr>
           </a:p>
           <a:p>
             <a:pPr lvl="1">
@@ -5532,13 +5445,6 @@
               </a:rPr>
               <a:t>",</a:t>
             </a:r>
-            <a:endParaRPr lang="en-US" sz="2162" dirty="0" smtClean="0">
-              <a:solidFill>
-                <a:srgbClr val="FF0000"/>
-              </a:solidFill>
-              <a:latin typeface="Courier"/>
-              <a:cs typeface="Courier"/>
-            </a:endParaRPr>
           </a:p>
           <a:p>
             <a:pPr lvl="1">
@@ -5562,7 +5468,17 @@
                 <a:latin typeface="Courier"/>
                 <a:cs typeface="Courier"/>
               </a:rPr>
-              <a:t>coap+ws://server.example.com/</a:t>
+              <a:t>coap+ws://server.example.com/ws</a:t>
+            </a:r>
+            <a:r>
+              <a:rPr lang="en-US" sz="2162" dirty="0" smtClean="0">
+                <a:solidFill>
+                  <a:srgbClr val="FF0000"/>
+                </a:solidFill>
+                <a:latin typeface="Courier"/>
+                <a:cs typeface="Courier"/>
+              </a:rPr>
+              <a:t>-endpoint&gt;; </a:t>
             </a:r>
             <a:r>
               <a:rPr lang="en-US" sz="2162" dirty="0" err="1" smtClean="0">
@@ -5572,7 +5488,7 @@
                 <a:latin typeface="Courier"/>
                 <a:cs typeface="Courier"/>
               </a:rPr>
-              <a:t>ws</a:t>
+              <a:t>rel</a:t>
             </a:r>
             <a:r>
               <a:rPr lang="en-US" sz="2162" dirty="0" smtClean="0">
@@ -5582,7 +5498,7 @@
                 <a:latin typeface="Courier"/>
                 <a:cs typeface="Courier"/>
               </a:rPr>
-              <a:t>-endpoint&gt;; </a:t>
+              <a:t>="</a:t>
             </a:r>
             <a:r>
               <a:rPr lang="en-US" sz="2162" dirty="0" err="1" smtClean="0">
@@ -5592,7 +5508,7 @@
                 <a:latin typeface="Courier"/>
                 <a:cs typeface="Courier"/>
               </a:rPr>
-              <a:t>rel</a:t>
+              <a:t>altloc</a:t>
             </a:r>
             <a:r>
               <a:rPr lang="en-US" sz="2162" dirty="0" smtClean="0">
@@ -5602,7 +5518,22 @@
                 <a:latin typeface="Courier"/>
                 <a:cs typeface="Courier"/>
               </a:rPr>
-              <a:t>="</a:t>
+              <a:t>",</a:t>
+            </a:r>
+          </a:p>
+          <a:p>
+            <a:pPr lvl="1">
+              <a:buNone/>
+            </a:pPr>
+            <a:r>
+              <a:rPr lang="en-US" sz="2162" dirty="0" smtClean="0">
+                <a:solidFill>
+                  <a:srgbClr val="FF0000"/>
+                </a:solidFill>
+                <a:latin typeface="Courier"/>
+                <a:cs typeface="Courier"/>
+              </a:rPr>
+              <a:t>&lt;coap+sms://001234567&gt;;</a:t>
             </a:r>
             <a:r>
               <a:rPr lang="en-US" sz="2162" dirty="0" err="1" smtClean="0">
@@ -5612,7 +5543,7 @@
                 <a:latin typeface="Courier"/>
                 <a:cs typeface="Courier"/>
               </a:rPr>
-              <a:t>altloc</a:t>
+              <a:t>rel</a:t>
             </a:r>
             <a:r>
               <a:rPr lang="en-US" sz="2162" dirty="0" smtClean="0">
@@ -5622,20 +5553,18 @@
                 <a:latin typeface="Courier"/>
                 <a:cs typeface="Courier"/>
               </a:rPr>
-              <a:t>",</a:t>
-            </a:r>
-            <a:endParaRPr lang="en-US" sz="2162" dirty="0" smtClean="0">
-              <a:solidFill>
-                <a:srgbClr val="FF0000"/>
-              </a:solidFill>
-              <a:latin typeface="Courier"/>
-              <a:cs typeface="Courier"/>
-            </a:endParaRPr>
-          </a:p>
-          <a:p>
-            <a:pPr lvl="1">
-              <a:buNone/>
-            </a:pPr>
+              <a:t>="</a:t>
+            </a:r>
+            <a:r>
+              <a:rPr lang="en-US" sz="2162" dirty="0" err="1" smtClean="0">
+                <a:solidFill>
+                  <a:srgbClr val="FF0000"/>
+                </a:solidFill>
+                <a:latin typeface="Courier"/>
+                <a:cs typeface="Courier"/>
+              </a:rPr>
+              <a:t>altloc</a:t>
+            </a:r>
             <a:r>
               <a:rPr lang="en-US" sz="2162" dirty="0" smtClean="0">
                 <a:solidFill>
@@ -5644,56 +5573,6 @@
                 <a:latin typeface="Courier"/>
                 <a:cs typeface="Courier"/>
               </a:rPr>
-              <a:t>&lt;</a:t>
-            </a:r>
-            <a:r>
-              <a:rPr lang="en-US" sz="2162" dirty="0" smtClean="0">
-                <a:solidFill>
-                  <a:srgbClr val="FF0000"/>
-                </a:solidFill>
-                <a:latin typeface="Courier"/>
-                <a:cs typeface="Courier"/>
-              </a:rPr>
-              <a:t>coap+sms://001234567&gt;;</a:t>
-            </a:r>
-            <a:r>
-              <a:rPr lang="en-US" sz="2162" dirty="0" err="1" smtClean="0">
-                <a:solidFill>
-                  <a:srgbClr val="FF0000"/>
-                </a:solidFill>
-                <a:latin typeface="Courier"/>
-                <a:cs typeface="Courier"/>
-              </a:rPr>
-              <a:t>rel</a:t>
-            </a:r>
-            <a:r>
-              <a:rPr lang="en-US" sz="2162" dirty="0" smtClean="0">
-                <a:solidFill>
-                  <a:srgbClr val="FF0000"/>
-                </a:solidFill>
-                <a:latin typeface="Courier"/>
-                <a:cs typeface="Courier"/>
-              </a:rPr>
-              <a:t>="</a:t>
-            </a:r>
-            <a:r>
-              <a:rPr lang="en-US" sz="2162" dirty="0" err="1" smtClean="0">
-                <a:solidFill>
-                  <a:srgbClr val="FF0000"/>
-                </a:solidFill>
-                <a:latin typeface="Courier"/>
-                <a:cs typeface="Courier"/>
-              </a:rPr>
-              <a:t>altloc</a:t>
-            </a:r>
-            <a:r>
-              <a:rPr lang="en-US" sz="2162" dirty="0" smtClean="0">
-                <a:solidFill>
-                  <a:srgbClr val="FF0000"/>
-                </a:solidFill>
-                <a:latin typeface="Courier"/>
-                <a:cs typeface="Courier"/>
-              </a:rPr>
               <a:t>”</a:t>
             </a:r>
           </a:p>
@@ -5745,15 +5624,7 @@
           <a:p>
             <a:r>
               <a:rPr lang="en-US" dirty="0" smtClean="0"/>
-              <a:t>IETF </a:t>
-            </a:r>
-            <a:r>
-              <a:rPr lang="en-US" dirty="0" smtClean="0"/>
-              <a:t>97 </a:t>
-            </a:r>
-            <a:r>
-              <a:rPr lang="en-US" dirty="0" smtClean="0"/>
-              <a:t>draft-silverajan-core-coap-transport-negotiation</a:t>
+              <a:t>IETF 97 draft-silverajan-core-coap-transport-negotiation</a:t>
             </a:r>
             <a:endParaRPr lang="en-GB" dirty="0"/>
           </a:p>
@@ -5826,21 +5697,7 @@
                 <a:latin typeface="Century Gothic"/>
                 <a:cs typeface="Century Gothic"/>
               </a:rPr>
-              <a:t>New optional </a:t>
-            </a:r>
-            <a:r>
-              <a:rPr lang="en-GB" sz="3556" dirty="0" smtClean="0">
-                <a:latin typeface="Century Gothic"/>
-                <a:cs typeface="Century Gothic"/>
-              </a:rPr>
-              <a:t>‘</a:t>
-            </a:r>
-            <a:r>
-              <a:rPr lang="en-GB" sz="3556" dirty="0" smtClean="0">
-                <a:latin typeface="Century Gothic"/>
-                <a:cs typeface="Century Gothic"/>
-              </a:rPr>
-              <a:t>at’ RD parameter</a:t>
+              <a:t>New optional ‘at’ RD parameter</a:t>
             </a:r>
             <a:endParaRPr lang="en-GB" sz="4000" dirty="0">
               <a:solidFill>
@@ -6042,68 +5899,33 @@
                 <a:latin typeface="Courier New"/>
                 <a:cs typeface="Courier New"/>
               </a:rPr>
-              <a:t>coap:/rd.example.com/</a:t>
+              <a:t>coap:/rd.example.com/rd?ep</a:t>
+            </a:r>
+            <a:r>
+              <a:rPr lang="en-US" sz="3400" b="1" dirty="0" smtClean="0">
+                <a:latin typeface="Courier New"/>
+                <a:cs typeface="Courier New"/>
+              </a:rPr>
+              <a:t>=node1&amp;</a:t>
+            </a:r>
+          </a:p>
+          <a:p>
+            <a:pPr>
+              <a:buNone/>
+            </a:pPr>
+            <a:r>
+              <a:rPr lang="en-US" sz="3400" b="1" dirty="0" smtClean="0">
+                <a:latin typeface="Courier New"/>
+                <a:cs typeface="Courier New"/>
+              </a:rPr>
+              <a:t>          at=</a:t>
             </a:r>
             <a:r>
               <a:rPr lang="en-US" sz="3400" b="1" dirty="0" err="1" smtClean="0">
                 <a:latin typeface="Courier New"/>
                 <a:cs typeface="Courier New"/>
               </a:rPr>
-              <a:t>rd?</a:t>
-            </a:r>
-            <a:r>
-              <a:rPr lang="en-US" sz="3400" b="1" dirty="0" err="1" smtClean="0">
-                <a:latin typeface="Courier New"/>
-                <a:cs typeface="Courier New"/>
-              </a:rPr>
-              <a:t>ep</a:t>
-            </a:r>
-            <a:r>
-              <a:rPr lang="en-US" sz="3400" b="1" dirty="0" smtClean="0">
-                <a:latin typeface="Courier New"/>
-                <a:cs typeface="Courier New"/>
-              </a:rPr>
-              <a:t>=node1</a:t>
-            </a:r>
-            <a:r>
-              <a:rPr lang="en-US" sz="3400" b="1" dirty="0" smtClean="0">
-                <a:latin typeface="Courier New"/>
-                <a:cs typeface="Courier New"/>
-              </a:rPr>
-              <a:t>&amp;</a:t>
-            </a:r>
-          </a:p>
-          <a:p>
-            <a:pPr>
-              <a:buNone/>
-            </a:pPr>
-            <a:r>
-              <a:rPr lang="en-US" sz="3400" b="1" dirty="0" smtClean="0">
-                <a:latin typeface="Courier New"/>
-                <a:cs typeface="Courier New"/>
-              </a:rPr>
-              <a:t>          at</a:t>
-            </a:r>
-            <a:r>
-              <a:rPr lang="en-US" sz="3400" b="1" dirty="0" smtClean="0">
-                <a:latin typeface="Courier New"/>
-                <a:cs typeface="Courier New"/>
-              </a:rPr>
-              <a:t>=</a:t>
-            </a:r>
-            <a:r>
-              <a:rPr lang="en-US" sz="3400" b="1" dirty="0" err="1" smtClean="0">
-                <a:latin typeface="Courier New"/>
-                <a:cs typeface="Courier New"/>
-              </a:rPr>
-              <a:t>coap+tcp://</a:t>
-            </a:r>
-            <a:r>
-              <a:rPr lang="en-US" sz="3400" b="1" dirty="0" err="1" smtClean="0">
-                <a:latin typeface="Courier New"/>
-                <a:cs typeface="Courier New"/>
-              </a:rPr>
-              <a:t>server.example.com</a:t>
+              <a:t>coap+tcp://server.example.com</a:t>
             </a:r>
             <a:endParaRPr lang="en-US" sz="3400" b="1" dirty="0" smtClean="0">
               <a:latin typeface="Courier New"/>
@@ -6119,14 +5941,19 @@
                 <a:latin typeface="Courier New"/>
                 <a:cs typeface="Courier New"/>
               </a:rPr>
-              <a:t> Content</a:t>
-            </a:r>
+              <a:t> Content-Format: 40</a:t>
+            </a:r>
+          </a:p>
+          <a:p>
+            <a:pPr>
+              <a:buNone/>
+            </a:pPr>
             <a:r>
               <a:rPr lang="en-US" sz="3400" b="1" dirty="0" smtClean="0">
                 <a:latin typeface="Courier New"/>
                 <a:cs typeface="Courier New"/>
               </a:rPr>
-              <a:t>-Format: 40</a:t>
+              <a:t> Payload:</a:t>
             </a:r>
           </a:p>
           <a:p>
@@ -6138,14 +5965,21 @@
                 <a:latin typeface="Courier New"/>
                 <a:cs typeface="Courier New"/>
               </a:rPr>
-              <a:t> Payload</a:t>
+              <a:t> &lt;/sensors/temp&gt;;ct=41;rt="temperature-</a:t>
+            </a:r>
+            <a:r>
+              <a:rPr lang="en-US" sz="3400" b="1" dirty="0" err="1" smtClean="0">
+                <a:latin typeface="Courier New"/>
+                <a:cs typeface="Courier New"/>
+              </a:rPr>
+              <a:t>f</a:t>
             </a:r>
             <a:r>
               <a:rPr lang="en-US" sz="3400" b="1" dirty="0" smtClean="0">
                 <a:latin typeface="Courier New"/>
                 <a:cs typeface="Courier New"/>
               </a:rPr>
-              <a:t>:</a:t>
+              <a:t>"; if="sensor",</a:t>
             </a:r>
           </a:p>
           <a:p>
@@ -6157,68 +5991,7 @@
                 <a:latin typeface="Courier New"/>
                 <a:cs typeface="Courier New"/>
               </a:rPr>
-              <a:t> &lt;</a:t>
-            </a:r>
-            <a:r>
-              <a:rPr lang="en-US" sz="3400" b="1" dirty="0" smtClean="0">
-                <a:latin typeface="Courier New"/>
-                <a:cs typeface="Courier New"/>
-              </a:rPr>
-              <a:t>/sensors/temp&gt;;ct=41;rt="</a:t>
-            </a:r>
-            <a:r>
-              <a:rPr lang="en-US" sz="3400" b="1" dirty="0" smtClean="0">
-                <a:latin typeface="Courier New"/>
-                <a:cs typeface="Courier New"/>
-              </a:rPr>
-              <a:t>temperature-</a:t>
-            </a:r>
-            <a:r>
-              <a:rPr lang="en-US" sz="3400" b="1" dirty="0" err="1" smtClean="0">
-                <a:latin typeface="Courier New"/>
-                <a:cs typeface="Courier New"/>
-              </a:rPr>
-              <a:t>f</a:t>
-            </a:r>
-            <a:r>
-              <a:rPr lang="en-US" sz="3400" b="1" dirty="0" smtClean="0">
-                <a:latin typeface="Courier New"/>
-                <a:cs typeface="Courier New"/>
-              </a:rPr>
-              <a:t>"</a:t>
-            </a:r>
-            <a:r>
-              <a:rPr lang="en-US" sz="3400" b="1" dirty="0" smtClean="0">
-                <a:latin typeface="Courier New"/>
-                <a:cs typeface="Courier New"/>
-              </a:rPr>
-              <a:t>; if</a:t>
-            </a:r>
-            <a:r>
-              <a:rPr lang="en-US" sz="3400" b="1" dirty="0" smtClean="0">
-                <a:latin typeface="Courier New"/>
-                <a:cs typeface="Courier New"/>
-              </a:rPr>
-              <a:t>="sensor",</a:t>
-            </a:r>
-          </a:p>
-          <a:p>
-            <a:pPr>
-              <a:buNone/>
-            </a:pPr>
-            <a:r>
-              <a:rPr lang="en-US" sz="3400" b="1" dirty="0" smtClean="0">
-                <a:latin typeface="Courier New"/>
-                <a:cs typeface="Courier New"/>
-              </a:rPr>
-              <a:t> &lt;</a:t>
-            </a:r>
-            <a:r>
-              <a:rPr lang="en-US" sz="3400" b="1" dirty="0" smtClean="0">
-                <a:latin typeface="Courier New"/>
-                <a:cs typeface="Courier New"/>
-              </a:rPr>
-              <a:t>/sensors/door&gt;;ct=41;rt="</a:t>
+              <a:t> &lt;/sensors/door&gt;;ct=41;rt="</a:t>
             </a:r>
             <a:r>
               <a:rPr lang="en-US" sz="3400" b="1" dirty="0" err="1" smtClean="0">
@@ -6253,33 +6026,19 @@
                 <a:latin typeface="Courier New"/>
                 <a:cs typeface="Courier New"/>
               </a:rPr>
-              <a:t> Res</a:t>
-            </a:r>
+              <a:t> Res: 2.01 Created</a:t>
+            </a:r>
+          </a:p>
+          <a:p>
+            <a:pPr>
+              <a:buNone/>
+            </a:pPr>
             <a:r>
               <a:rPr lang="en-US" sz="3400" b="1" dirty="0" smtClean="0">
                 <a:latin typeface="Courier New"/>
                 <a:cs typeface="Courier New"/>
               </a:rPr>
-              <a:t>: 2.01 Created</a:t>
-            </a:r>
-          </a:p>
-          <a:p>
-            <a:pPr>
-              <a:buNone/>
-            </a:pPr>
-            <a:r>
-              <a:rPr lang="en-US" sz="3400" b="1" dirty="0" smtClean="0">
-                <a:latin typeface="Courier New"/>
-                <a:cs typeface="Courier New"/>
-              </a:rPr>
-              <a:t> Location</a:t>
-            </a:r>
-            <a:r>
-              <a:rPr lang="en-US" sz="3400" b="1" dirty="0" smtClean="0">
-                <a:latin typeface="Courier New"/>
-                <a:cs typeface="Courier New"/>
-              </a:rPr>
-              <a:t>: /rd/4521</a:t>
+              <a:t> Location: /rd/4521</a:t>
             </a:r>
           </a:p>
           <a:p>
@@ -6357,15 +6116,7 @@
           <a:p>
             <a:r>
               <a:rPr lang="en-US" dirty="0" smtClean="0"/>
-              <a:t>IETF </a:t>
-            </a:r>
-            <a:r>
-              <a:rPr lang="en-US" dirty="0" smtClean="0"/>
-              <a:t>97 </a:t>
-            </a:r>
-            <a:r>
-              <a:rPr lang="en-US" dirty="0" smtClean="0"/>
-              <a:t>draft-silverajan-core-coap-transport-negotiation</a:t>
+              <a:t>IETF 97 draft-silverajan-core-coap-transport-negotiation</a:t>
             </a:r>
             <a:endParaRPr lang="en-GB" dirty="0"/>
           </a:p>
@@ -6462,28 +6213,14 @@
                 <a:latin typeface="Century Gothic"/>
                 <a:cs typeface="Century Gothic"/>
               </a:rPr>
-              <a:t>New optional </a:t>
-            </a:r>
-            <a:r>
-              <a:rPr lang="en-GB" sz="3556" dirty="0" smtClean="0">
-                <a:latin typeface="Century Gothic"/>
-                <a:cs typeface="Century Gothic"/>
-              </a:rPr>
-              <a:t>‘</a:t>
+              <a:t>New optional ‘</a:t>
             </a:r>
             <a:r>
               <a:rPr lang="en-GB" sz="3556" dirty="0" err="1" smtClean="0">
                 <a:latin typeface="Century Gothic"/>
                 <a:cs typeface="Century Gothic"/>
               </a:rPr>
-              <a:t>t</a:t>
-            </a:r>
-            <a:r>
-              <a:rPr lang="en-GB" sz="3556" dirty="0" err="1" smtClean="0">
-                <a:latin typeface="Century Gothic"/>
-                <a:cs typeface="Century Gothic"/>
-              </a:rPr>
-              <a:t>t</a:t>
+              <a:t>tt</a:t>
             </a:r>
             <a:r>
               <a:rPr lang="en-GB" sz="3556" dirty="0" smtClean="0">
@@ -6852,15 +6589,7 @@
           <a:p>
             <a:r>
               <a:rPr lang="en-US" dirty="0" smtClean="0"/>
-              <a:t>IETF </a:t>
-            </a:r>
-            <a:r>
-              <a:rPr lang="en-US" dirty="0" smtClean="0"/>
-              <a:t>97 </a:t>
-            </a:r>
-            <a:r>
-              <a:rPr lang="en-US" dirty="0" smtClean="0"/>
-              <a:t>draft-silverajan-core-coap-transport-negotiation</a:t>
+              <a:t>IETF 97 draft-silverajan-core-coap-transport-negotiation</a:t>
             </a:r>
             <a:endParaRPr lang="en-GB" dirty="0"/>
           </a:p>
@@ -7026,23 +6755,19 @@
               <a:t>DNS SD and DNS-based Service </a:t>
             </a:r>
             <a:r>
-              <a:rPr lang="en-GB" dirty="0" err="1" smtClean="0">
-                <a:latin typeface="Century Gothic"/>
-                <a:cs typeface="Century Gothic"/>
-              </a:rPr>
-              <a:t>Discvoery</a:t>
-            </a:r>
-            <a:r>
               <a:rPr lang="en-GB" dirty="0" smtClean="0">
                 <a:latin typeface="Century Gothic"/>
                 <a:cs typeface="Century Gothic"/>
               </a:rPr>
-              <a:t> may be possible</a:t>
-            </a:r>
-            <a:endParaRPr lang="en-GB" dirty="0" smtClean="0">
-              <a:latin typeface="Century Gothic"/>
-              <a:cs typeface="Century Gothic"/>
-            </a:endParaRPr>
+              <a:t>Discovery </a:t>
+            </a:r>
+            <a:r>
+              <a:rPr lang="en-GB" dirty="0" smtClean="0">
+                <a:latin typeface="Century Gothic"/>
+                <a:cs typeface="Century Gothic"/>
+              </a:rPr>
+              <a:t>may be possible</a:t>
+            </a:r>
           </a:p>
           <a:p>
             <a:pPr>
@@ -7098,15 +6823,7 @@
           <a:p>
             <a:r>
               <a:rPr lang="en-US" dirty="0" smtClean="0"/>
-              <a:t>IETF </a:t>
-            </a:r>
-            <a:r>
-              <a:rPr lang="en-US" dirty="0" smtClean="0"/>
-              <a:t>97 </a:t>
-            </a:r>
-            <a:r>
-              <a:rPr lang="en-US" dirty="0" smtClean="0"/>
-              <a:t>draft-silverajan-core-coap-transport-negotiation</a:t>
+              <a:t>IETF 97 draft-silverajan-core-coap-transport-negotiation</a:t>
             </a:r>
             <a:endParaRPr lang="en-GB" dirty="0"/>
           </a:p>
@@ -7200,30 +6917,27 @@
                 <a:latin typeface="Century Gothic"/>
                 <a:cs typeface="Century Gothic"/>
               </a:rPr>
-              <a:t>Alternative transport lifetime currently bound to registration lifetime (unless we introduce a new RD parameter)</a:t>
-            </a:r>
-          </a:p>
-          <a:p>
+              <a:t>Alternative transport lifetime currently bound to registration lifetime (unless we introduce a new RD </a:t>
+            </a:r>
             <a:r>
               <a:rPr lang="en-GB" dirty="0" smtClean="0">
                 <a:latin typeface="Century Gothic"/>
                 <a:cs typeface="Century Gothic"/>
               </a:rPr>
-              <a:t>A simple means for clients to signal </a:t>
-            </a:r>
+              <a:t>parameter per transport, which is challenging)</a:t>
+            </a:r>
+            <a:endParaRPr lang="en-GB" dirty="0" smtClean="0">
+              <a:latin typeface="Century Gothic"/>
+              <a:cs typeface="Century Gothic"/>
+            </a:endParaRPr>
+          </a:p>
+          <a:p>
             <a:r>
               <a:rPr lang="en-GB" dirty="0" smtClean="0">
                 <a:latin typeface="Century Gothic"/>
                 <a:cs typeface="Century Gothic"/>
               </a:rPr>
-              <a:t>a</a:t>
-            </a:r>
-            <a:r>
-              <a:rPr lang="en-GB" dirty="0" smtClean="0">
-                <a:latin typeface="Century Gothic"/>
-                <a:cs typeface="Century Gothic"/>
-              </a:rPr>
-              <a:t> server to temporarily enable an alternative transport (for energy-constrained origin servers) is missing</a:t>
+              <a:t>A simple means for clients to signal a server to temporarily enable an alternative transport (for energy-constrained origin servers) is missing</a:t>
             </a:r>
           </a:p>
         </p:txBody>
@@ -7274,15 +6988,7 @@
           <a:p>
             <a:r>
               <a:rPr lang="en-US" dirty="0" smtClean="0"/>
-              <a:t>IETF </a:t>
-            </a:r>
-            <a:r>
-              <a:rPr lang="en-US" dirty="0" smtClean="0"/>
-              <a:t>97 </a:t>
-            </a:r>
-            <a:r>
-              <a:rPr lang="en-US" dirty="0" smtClean="0"/>
-              <a:t>draft-silverajan-core-coap-transport-negotiation</a:t>
+              <a:t>IETF 97 draft-silverajan-core-coap-transport-negotiation</a:t>
             </a:r>
             <a:endParaRPr lang="en-GB" dirty="0"/>
           </a:p>

</xml_diff>